<commit_message>
ajustes para sprint 3
</commit_message>
<xml_diff>
--- a/doc/sprint2/SPRINT_2_POC_INDIVIDUAL.pptx
+++ b/doc/sprint2/SPRINT_2_POC_INDIVIDUAL.pptx
@@ -6,12 +6,13 @@
   </p:sldMasterIdLst>
   <p:sldIdLst>
     <p:sldId id="256" r:id="rId2"/>
-    <p:sldId id="257" r:id="rId3"/>
-    <p:sldId id="258" r:id="rId4"/>
-    <p:sldId id="259" r:id="rId5"/>
-    <p:sldId id="260" r:id="rId6"/>
-    <p:sldId id="261" r:id="rId7"/>
-    <p:sldId id="262" r:id="rId8"/>
+    <p:sldId id="263" r:id="rId3"/>
+    <p:sldId id="257" r:id="rId4"/>
+    <p:sldId id="258" r:id="rId5"/>
+    <p:sldId id="259" r:id="rId6"/>
+    <p:sldId id="260" r:id="rId7"/>
+    <p:sldId id="261" r:id="rId8"/>
+    <p:sldId id="262" r:id="rId9"/>
   </p:sldIdLst>
   <p:sldSz cx="12192000" cy="6858000"/>
   <p:notesSz cx="6858000" cy="9144000"/>
@@ -276,7 +277,7 @@
           <a:p>
             <a:fld id="{55B9F3E8-974F-4543-AF57-D7E92212E668}" type="datetimeFigureOut">
               <a:rPr lang="en-US" smtClean="0"/>
-              <a:t>4/26/2022</a:t>
+              <a:t>4/28/2022</a:t>
             </a:fld>
             <a:endParaRPr lang="en-US"/>
           </a:p>
@@ -474,7 +475,7 @@
           <a:p>
             <a:fld id="{55B9F3E8-974F-4543-AF57-D7E92212E668}" type="datetimeFigureOut">
               <a:rPr lang="en-US" smtClean="0"/>
-              <a:t>4/26/2022</a:t>
+              <a:t>4/28/2022</a:t>
             </a:fld>
             <a:endParaRPr lang="en-US"/>
           </a:p>
@@ -682,7 +683,7 @@
           <a:p>
             <a:fld id="{55B9F3E8-974F-4543-AF57-D7E92212E668}" type="datetimeFigureOut">
               <a:rPr lang="en-US" smtClean="0"/>
-              <a:t>4/26/2022</a:t>
+              <a:t>4/28/2022</a:t>
             </a:fld>
             <a:endParaRPr lang="en-US"/>
           </a:p>
@@ -880,7 +881,7 @@
           <a:p>
             <a:fld id="{55B9F3E8-974F-4543-AF57-D7E92212E668}" type="datetimeFigureOut">
               <a:rPr lang="en-US" smtClean="0"/>
-              <a:t>4/26/2022</a:t>
+              <a:t>4/28/2022</a:t>
             </a:fld>
             <a:endParaRPr lang="en-US"/>
           </a:p>
@@ -1155,7 +1156,7 @@
           <a:p>
             <a:fld id="{55B9F3E8-974F-4543-AF57-D7E92212E668}" type="datetimeFigureOut">
               <a:rPr lang="en-US" smtClean="0"/>
-              <a:t>4/26/2022</a:t>
+              <a:t>4/28/2022</a:t>
             </a:fld>
             <a:endParaRPr lang="en-US"/>
           </a:p>
@@ -1420,7 +1421,7 @@
           <a:p>
             <a:fld id="{55B9F3E8-974F-4543-AF57-D7E92212E668}" type="datetimeFigureOut">
               <a:rPr lang="en-US" smtClean="0"/>
-              <a:t>4/26/2022</a:t>
+              <a:t>4/28/2022</a:t>
             </a:fld>
             <a:endParaRPr lang="en-US"/>
           </a:p>
@@ -1832,7 +1833,7 @@
           <a:p>
             <a:fld id="{55B9F3E8-974F-4543-AF57-D7E92212E668}" type="datetimeFigureOut">
               <a:rPr lang="en-US" smtClean="0"/>
-              <a:t>4/26/2022</a:t>
+              <a:t>4/28/2022</a:t>
             </a:fld>
             <a:endParaRPr lang="en-US"/>
           </a:p>
@@ -1973,7 +1974,7 @@
           <a:p>
             <a:fld id="{55B9F3E8-974F-4543-AF57-D7E92212E668}" type="datetimeFigureOut">
               <a:rPr lang="en-US" smtClean="0"/>
-              <a:t>4/26/2022</a:t>
+              <a:t>4/28/2022</a:t>
             </a:fld>
             <a:endParaRPr lang="en-US"/>
           </a:p>
@@ -2086,7 +2087,7 @@
           <a:p>
             <a:fld id="{55B9F3E8-974F-4543-AF57-D7E92212E668}" type="datetimeFigureOut">
               <a:rPr lang="en-US" smtClean="0"/>
-              <a:t>4/26/2022</a:t>
+              <a:t>4/28/2022</a:t>
             </a:fld>
             <a:endParaRPr lang="en-US"/>
           </a:p>
@@ -2397,7 +2398,7 @@
           <a:p>
             <a:fld id="{55B9F3E8-974F-4543-AF57-D7E92212E668}" type="datetimeFigureOut">
               <a:rPr lang="en-US" smtClean="0"/>
-              <a:t>4/26/2022</a:t>
+              <a:t>4/28/2022</a:t>
             </a:fld>
             <a:endParaRPr lang="en-US"/>
           </a:p>
@@ -2685,7 +2686,7 @@
           <a:p>
             <a:fld id="{55B9F3E8-974F-4543-AF57-D7E92212E668}" type="datetimeFigureOut">
               <a:rPr lang="en-US" smtClean="0"/>
-              <a:t>4/26/2022</a:t>
+              <a:t>4/28/2022</a:t>
             </a:fld>
             <a:endParaRPr lang="en-US"/>
           </a:p>
@@ -2926,7 +2927,7 @@
           <a:p>
             <a:fld id="{55B9F3E8-974F-4543-AF57-D7E92212E668}" type="datetimeFigureOut">
               <a:rPr lang="en-US" smtClean="0"/>
-              <a:t>4/26/2022</a:t>
+              <a:t>4/28/2022</a:t>
             </a:fld>
             <a:endParaRPr lang="en-US"/>
           </a:p>
@@ -3424,7 +3425,7 @@
         </p:nvSpPr>
         <p:spPr>
           <a:xfrm>
-            <a:off x="9369467" y="5781567"/>
+            <a:off x="9435263" y="5805488"/>
             <a:ext cx="2676395" cy="907332"/>
           </a:xfrm>
         </p:spPr>
@@ -3442,25 +3443,6 @@
               </a:rPr>
               <a:t>GRUPO – 09 </a:t>
             </a:r>
-          </a:p>
-          <a:p>
-            <a:r>
-              <a:rPr lang="pt-BR" dirty="0">
-                <a:solidFill>
-                  <a:schemeClr val="bg1">
-                    <a:lumMod val="50000"/>
-                  </a:schemeClr>
-                </a:solidFill>
-              </a:rPr>
-              <a:t>LUIZA BEZERRA</a:t>
-            </a:r>
-            <a:endParaRPr lang="en-US" dirty="0">
-              <a:solidFill>
-                <a:schemeClr val="bg1">
-                  <a:lumMod val="50000"/>
-                </a:schemeClr>
-              </a:solidFill>
-            </a:endParaRPr>
           </a:p>
         </p:txBody>
       </p:sp>
@@ -4004,6 +3986,366 @@
       </p:grpSpPr>
       <p:sp>
         <p:nvSpPr>
+          <p:cNvPr id="3" name="Subtitle 2">
+            <a:extLst>
+              <a:ext uri="{FF2B5EF4-FFF2-40B4-BE49-F238E27FC236}">
+                <a16:creationId xmlns:a16="http://schemas.microsoft.com/office/drawing/2014/main" id="{0C4B7404-6ABD-4389-A7FD-94C50C77BCFD}"/>
+              </a:ext>
+            </a:extLst>
+          </p:cNvPr>
+          <p:cNvSpPr>
+            <a:spLocks noGrp="1"/>
+          </p:cNvSpPr>
+          <p:nvPr>
+            <p:ph type="subTitle" idx="1"/>
+          </p:nvPr>
+        </p:nvSpPr>
+        <p:spPr>
+          <a:xfrm>
+            <a:off x="3767190" y="2521667"/>
+            <a:ext cx="4657618" cy="2644221"/>
+          </a:xfrm>
+        </p:spPr>
+        <p:txBody>
+          <a:bodyPr>
+            <a:noAutofit/>
+          </a:bodyPr>
+          <a:lstStyle/>
+          <a:p>
+            <a:r>
+              <a:rPr lang="pt-BR" sz="9600" dirty="0">
+                <a:solidFill>
+                  <a:schemeClr val="bg1">
+                    <a:lumMod val="95000"/>
+                  </a:schemeClr>
+                </a:solidFill>
+              </a:rPr>
+              <a:t>LUIZA BEZERRA</a:t>
+            </a:r>
+            <a:endParaRPr lang="en-US" sz="9600" dirty="0">
+              <a:solidFill>
+                <a:schemeClr val="bg1">
+                  <a:lumMod val="95000"/>
+                </a:schemeClr>
+              </a:solidFill>
+            </a:endParaRPr>
+          </a:p>
+        </p:txBody>
+      </p:sp>
+      <p:sp>
+        <p:nvSpPr>
+          <p:cNvPr id="4" name="Title 1">
+            <a:extLst>
+              <a:ext uri="{FF2B5EF4-FFF2-40B4-BE49-F238E27FC236}">
+                <a16:creationId xmlns:a16="http://schemas.microsoft.com/office/drawing/2014/main" id="{A67FB082-3640-44BD-836D-7413D0C6639A}"/>
+              </a:ext>
+            </a:extLst>
+          </p:cNvPr>
+          <p:cNvSpPr txBox="1">
+            <a:spLocks/>
+          </p:cNvSpPr>
+          <p:nvPr/>
+        </p:nvSpPr>
+        <p:spPr>
+          <a:xfrm>
+            <a:off x="1824623" y="2080744"/>
+            <a:ext cx="7544844" cy="1453018"/>
+          </a:xfrm>
+          <a:prstGeom prst="rect">
+            <a:avLst/>
+          </a:prstGeom>
+        </p:spPr>
+        <p:txBody>
+          <a:bodyPr vert="horz" lIns="91440" tIns="45720" rIns="91440" bIns="45720" rtlCol="0" anchor="b">
+            <a:normAutofit/>
+          </a:bodyPr>
+          <a:lstStyle>
+            <a:lvl1pPr algn="ctr" defTabSz="914400" rtl="0" eaLnBrk="1" latinLnBrk="0" hangingPunct="1">
+              <a:lnSpc>
+                <a:spcPct val="90000"/>
+              </a:lnSpc>
+              <a:spcBef>
+                <a:spcPct val="0"/>
+              </a:spcBef>
+              <a:buNone/>
+              <a:defRPr sz="6000" kern="1200">
+                <a:solidFill>
+                  <a:schemeClr val="tx1"/>
+                </a:solidFill>
+                <a:latin typeface="+mj-lt"/>
+                <a:ea typeface="+mj-ea"/>
+                <a:cs typeface="+mj-cs"/>
+              </a:defRPr>
+            </a:lvl1pPr>
+          </a:lstStyle>
+          <a:p>
+            <a:endParaRPr lang="en-US" sz="9600" b="1" dirty="0">
+              <a:solidFill>
+                <a:schemeClr val="bg1">
+                  <a:lumMod val="85000"/>
+                </a:schemeClr>
+              </a:solidFill>
+              <a:latin typeface="Arial Black" panose="020B0A04020102020204" pitchFamily="34" charset="0"/>
+              <a:cs typeface="Aharoni" panose="02010803020104030203" pitchFamily="2" charset="-79"/>
+            </a:endParaRPr>
+          </a:p>
+        </p:txBody>
+      </p:sp>
+      <p:sp>
+        <p:nvSpPr>
+          <p:cNvPr id="5" name="Subtitle 2">
+            <a:extLst>
+              <a:ext uri="{FF2B5EF4-FFF2-40B4-BE49-F238E27FC236}">
+                <a16:creationId xmlns:a16="http://schemas.microsoft.com/office/drawing/2014/main" id="{4002E832-D96C-49D8-88BF-5693BBC438E0}"/>
+              </a:ext>
+            </a:extLst>
+          </p:cNvPr>
+          <p:cNvSpPr txBox="1">
+            <a:spLocks/>
+          </p:cNvSpPr>
+          <p:nvPr/>
+        </p:nvSpPr>
+        <p:spPr>
+          <a:xfrm>
+            <a:off x="-155199" y="1509574"/>
+            <a:ext cx="12125325" cy="907332"/>
+          </a:xfrm>
+          <a:prstGeom prst="rect">
+            <a:avLst/>
+          </a:prstGeom>
+        </p:spPr>
+        <p:txBody>
+          <a:bodyPr vert="horz" lIns="91440" tIns="45720" rIns="91440" bIns="45720" rtlCol="0">
+            <a:normAutofit/>
+          </a:bodyPr>
+          <a:lstStyle>
+            <a:lvl1pPr marL="0" indent="0" algn="ctr" defTabSz="914400" rtl="0" eaLnBrk="1" latinLnBrk="0" hangingPunct="1">
+              <a:lnSpc>
+                <a:spcPct val="90000"/>
+              </a:lnSpc>
+              <a:spcBef>
+                <a:spcPts val="1000"/>
+              </a:spcBef>
+              <a:buFont typeface="Arial" panose="020B0604020202020204" pitchFamily="34" charset="0"/>
+              <a:buNone/>
+              <a:defRPr sz="2400" kern="1200">
+                <a:solidFill>
+                  <a:schemeClr val="tx1"/>
+                </a:solidFill>
+                <a:latin typeface="+mn-lt"/>
+                <a:ea typeface="+mn-ea"/>
+                <a:cs typeface="+mn-cs"/>
+              </a:defRPr>
+            </a:lvl1pPr>
+            <a:lvl2pPr marL="457200" indent="0" algn="ctr" defTabSz="914400" rtl="0" eaLnBrk="1" latinLnBrk="0" hangingPunct="1">
+              <a:lnSpc>
+                <a:spcPct val="90000"/>
+              </a:lnSpc>
+              <a:spcBef>
+                <a:spcPts val="500"/>
+              </a:spcBef>
+              <a:buFont typeface="Arial" panose="020B0604020202020204" pitchFamily="34" charset="0"/>
+              <a:buNone/>
+              <a:defRPr sz="2000" kern="1200">
+                <a:solidFill>
+                  <a:schemeClr val="tx1"/>
+                </a:solidFill>
+                <a:latin typeface="+mn-lt"/>
+                <a:ea typeface="+mn-ea"/>
+                <a:cs typeface="+mn-cs"/>
+              </a:defRPr>
+            </a:lvl2pPr>
+            <a:lvl3pPr marL="914400" indent="0" algn="ctr" defTabSz="914400" rtl="0" eaLnBrk="1" latinLnBrk="0" hangingPunct="1">
+              <a:lnSpc>
+                <a:spcPct val="90000"/>
+              </a:lnSpc>
+              <a:spcBef>
+                <a:spcPts val="500"/>
+              </a:spcBef>
+              <a:buFont typeface="Arial" panose="020B0604020202020204" pitchFamily="34" charset="0"/>
+              <a:buNone/>
+              <a:defRPr sz="1800" kern="1200">
+                <a:solidFill>
+                  <a:schemeClr val="tx1"/>
+                </a:solidFill>
+                <a:latin typeface="+mn-lt"/>
+                <a:ea typeface="+mn-ea"/>
+                <a:cs typeface="+mn-cs"/>
+              </a:defRPr>
+            </a:lvl3pPr>
+            <a:lvl4pPr marL="1371600" indent="0" algn="ctr" defTabSz="914400" rtl="0" eaLnBrk="1" latinLnBrk="0" hangingPunct="1">
+              <a:lnSpc>
+                <a:spcPct val="90000"/>
+              </a:lnSpc>
+              <a:spcBef>
+                <a:spcPts val="500"/>
+              </a:spcBef>
+              <a:buFont typeface="Arial" panose="020B0604020202020204" pitchFamily="34" charset="0"/>
+              <a:buNone/>
+              <a:defRPr sz="1600" kern="1200">
+                <a:solidFill>
+                  <a:schemeClr val="tx1"/>
+                </a:solidFill>
+                <a:latin typeface="+mn-lt"/>
+                <a:ea typeface="+mn-ea"/>
+                <a:cs typeface="+mn-cs"/>
+              </a:defRPr>
+            </a:lvl4pPr>
+            <a:lvl5pPr marL="1828800" indent="0" algn="ctr" defTabSz="914400" rtl="0" eaLnBrk="1" latinLnBrk="0" hangingPunct="1">
+              <a:lnSpc>
+                <a:spcPct val="90000"/>
+              </a:lnSpc>
+              <a:spcBef>
+                <a:spcPts val="500"/>
+              </a:spcBef>
+              <a:buFont typeface="Arial" panose="020B0604020202020204" pitchFamily="34" charset="0"/>
+              <a:buNone/>
+              <a:defRPr sz="1600" kern="1200">
+                <a:solidFill>
+                  <a:schemeClr val="tx1"/>
+                </a:solidFill>
+                <a:latin typeface="+mn-lt"/>
+                <a:ea typeface="+mn-ea"/>
+                <a:cs typeface="+mn-cs"/>
+              </a:defRPr>
+            </a:lvl5pPr>
+            <a:lvl6pPr marL="2286000" indent="0" algn="ctr" defTabSz="914400" rtl="0" eaLnBrk="1" latinLnBrk="0" hangingPunct="1">
+              <a:lnSpc>
+                <a:spcPct val="90000"/>
+              </a:lnSpc>
+              <a:spcBef>
+                <a:spcPts val="500"/>
+              </a:spcBef>
+              <a:buFont typeface="Arial" panose="020B0604020202020204" pitchFamily="34" charset="0"/>
+              <a:buNone/>
+              <a:defRPr sz="1600" kern="1200">
+                <a:solidFill>
+                  <a:schemeClr val="tx1"/>
+                </a:solidFill>
+                <a:latin typeface="+mn-lt"/>
+                <a:ea typeface="+mn-ea"/>
+                <a:cs typeface="+mn-cs"/>
+              </a:defRPr>
+            </a:lvl6pPr>
+            <a:lvl7pPr marL="2743200" indent="0" algn="ctr" defTabSz="914400" rtl="0" eaLnBrk="1" latinLnBrk="0" hangingPunct="1">
+              <a:lnSpc>
+                <a:spcPct val="90000"/>
+              </a:lnSpc>
+              <a:spcBef>
+                <a:spcPts val="500"/>
+              </a:spcBef>
+              <a:buFont typeface="Arial" panose="020B0604020202020204" pitchFamily="34" charset="0"/>
+              <a:buNone/>
+              <a:defRPr sz="1600" kern="1200">
+                <a:solidFill>
+                  <a:schemeClr val="tx1"/>
+                </a:solidFill>
+                <a:latin typeface="+mn-lt"/>
+                <a:ea typeface="+mn-ea"/>
+                <a:cs typeface="+mn-cs"/>
+              </a:defRPr>
+            </a:lvl7pPr>
+            <a:lvl8pPr marL="3200400" indent="0" algn="ctr" defTabSz="914400" rtl="0" eaLnBrk="1" latinLnBrk="0" hangingPunct="1">
+              <a:lnSpc>
+                <a:spcPct val="90000"/>
+              </a:lnSpc>
+              <a:spcBef>
+                <a:spcPts val="500"/>
+              </a:spcBef>
+              <a:buFont typeface="Arial" panose="020B0604020202020204" pitchFamily="34" charset="0"/>
+              <a:buNone/>
+              <a:defRPr sz="1600" kern="1200">
+                <a:solidFill>
+                  <a:schemeClr val="tx1"/>
+                </a:solidFill>
+                <a:latin typeface="+mn-lt"/>
+                <a:ea typeface="+mn-ea"/>
+                <a:cs typeface="+mn-cs"/>
+              </a:defRPr>
+            </a:lvl8pPr>
+            <a:lvl9pPr marL="3657600" indent="0" algn="ctr" defTabSz="914400" rtl="0" eaLnBrk="1" latinLnBrk="0" hangingPunct="1">
+              <a:lnSpc>
+                <a:spcPct val="90000"/>
+              </a:lnSpc>
+              <a:spcBef>
+                <a:spcPts val="500"/>
+              </a:spcBef>
+              <a:buFont typeface="Arial" panose="020B0604020202020204" pitchFamily="34" charset="0"/>
+              <a:buNone/>
+              <a:defRPr sz="1600" kern="1200">
+                <a:solidFill>
+                  <a:schemeClr val="tx1"/>
+                </a:solidFill>
+                <a:latin typeface="+mn-lt"/>
+                <a:ea typeface="+mn-ea"/>
+                <a:cs typeface="+mn-cs"/>
+              </a:defRPr>
+            </a:lvl9pPr>
+          </a:lstStyle>
+          <a:p>
+            <a:r>
+              <a:rPr lang="pt-BR" dirty="0">
+                <a:solidFill>
+                  <a:schemeClr val="bg1">
+                    <a:lumMod val="50000"/>
+                  </a:schemeClr>
+                </a:solidFill>
+              </a:rPr>
+              <a:t>SPRINT 2 – 2022 </a:t>
+            </a:r>
+            <a:endParaRPr lang="en-US" dirty="0">
+              <a:solidFill>
+                <a:schemeClr val="bg1">
+                  <a:lumMod val="50000"/>
+                </a:schemeClr>
+              </a:solidFill>
+            </a:endParaRPr>
+          </a:p>
+        </p:txBody>
+      </p:sp>
+    </p:spTree>
+    <p:extLst>
+      <p:ext uri="{BB962C8B-B14F-4D97-AF65-F5344CB8AC3E}">
+        <p14:creationId xmlns:p14="http://schemas.microsoft.com/office/powerpoint/2010/main" val="238267593"/>
+      </p:ext>
+    </p:extLst>
+  </p:cSld>
+  <p:clrMapOvr>
+    <a:masterClrMapping/>
+  </p:clrMapOvr>
+</p:sld>
+</file>
+
+<file path=ppt/slides/slide3.xml><?xml version="1.0" encoding="utf-8"?>
+<p:sld xmlns:a="http://schemas.openxmlformats.org/drawingml/2006/main" xmlns:r="http://schemas.openxmlformats.org/officeDocument/2006/relationships" xmlns:p="http://schemas.openxmlformats.org/presentationml/2006/main" show="0">
+  <p:cSld>
+    <p:bg>
+      <p:bgPr>
+        <a:solidFill>
+          <a:schemeClr val="tx1">
+            <a:lumMod val="85000"/>
+            <a:lumOff val="15000"/>
+          </a:schemeClr>
+        </a:solidFill>
+        <a:effectLst/>
+      </p:bgPr>
+    </p:bg>
+    <p:spTree>
+      <p:nvGrpSpPr>
+        <p:cNvPr id="1" name=""/>
+        <p:cNvGrpSpPr/>
+        <p:nvPr/>
+      </p:nvGrpSpPr>
+      <p:grpSpPr>
+        <a:xfrm>
+          <a:off x="0" y="0"/>
+          <a:ext cx="0" cy="0"/>
+          <a:chOff x="0" y="0"/>
+          <a:chExt cx="0" cy="0"/>
+        </a:xfrm>
+      </p:grpSpPr>
+      <p:sp>
+        <p:nvSpPr>
           <p:cNvPr id="16" name="Rectangle 15">
             <a:extLst>
               <a:ext uri="{FF2B5EF4-FFF2-40B4-BE49-F238E27FC236}">
@@ -5273,7 +5615,7 @@
                 <a:effectLst/>
                 <a:latin typeface="verdana" panose="020B0604030504040204" pitchFamily="34" charset="0"/>
               </a:rPr>
-              <a:t>Análise do algoritmo de soma de n entradas.</a:t>
+              <a:t>Análise do algoritmo de soma de N entradas.</a:t>
             </a:r>
           </a:p>
           <a:p>
@@ -5729,7 +6071,7 @@
 </p:sld>
 </file>
 
-<file path=ppt/slides/slide3.xml><?xml version="1.0" encoding="utf-8"?>
+<file path=ppt/slides/slide4.xml><?xml version="1.0" encoding="utf-8"?>
 <p:sld xmlns:a="http://schemas.openxmlformats.org/drawingml/2006/main" xmlns:r="http://schemas.openxmlformats.org/officeDocument/2006/relationships" xmlns:p="http://schemas.openxmlformats.org/presentationml/2006/main">
   <p:cSld>
     <p:bg>
@@ -6318,458 +6660,6 @@
     <p:extLst>
       <p:ext uri="{BB962C8B-B14F-4D97-AF65-F5344CB8AC3E}">
         <p14:creationId xmlns:p14="http://schemas.microsoft.com/office/powerpoint/2010/main" val="1361874108"/>
-      </p:ext>
-    </p:extLst>
-  </p:cSld>
-  <p:clrMapOvr>
-    <a:masterClrMapping/>
-  </p:clrMapOvr>
-</p:sld>
-</file>
-
-<file path=ppt/slides/slide4.xml><?xml version="1.0" encoding="utf-8"?>
-<p:sld xmlns:a="http://schemas.openxmlformats.org/drawingml/2006/main" xmlns:r="http://schemas.openxmlformats.org/officeDocument/2006/relationships" xmlns:p="http://schemas.openxmlformats.org/presentationml/2006/main">
-  <p:cSld>
-    <p:bg>
-      <p:bgPr>
-        <a:solidFill>
-          <a:schemeClr val="tx1">
-            <a:lumMod val="85000"/>
-            <a:lumOff val="15000"/>
-          </a:schemeClr>
-        </a:solidFill>
-        <a:effectLst/>
-      </p:bgPr>
-    </p:bg>
-    <p:spTree>
-      <p:nvGrpSpPr>
-        <p:cNvPr id="1" name=""/>
-        <p:cNvGrpSpPr/>
-        <p:nvPr/>
-      </p:nvGrpSpPr>
-      <p:grpSpPr>
-        <a:xfrm>
-          <a:off x="0" y="0"/>
-          <a:ext cx="0" cy="0"/>
-          <a:chOff x="0" y="0"/>
-          <a:chExt cx="0" cy="0"/>
-        </a:xfrm>
-      </p:grpSpPr>
-      <p:sp>
-        <p:nvSpPr>
-          <p:cNvPr id="19" name="Subtitle 2">
-            <a:extLst>
-              <a:ext uri="{FF2B5EF4-FFF2-40B4-BE49-F238E27FC236}">
-                <a16:creationId xmlns:a16="http://schemas.microsoft.com/office/drawing/2014/main" id="{0DFDD307-DE49-4B0C-AB7A-6806D6626CBC}"/>
-              </a:ext>
-            </a:extLst>
-          </p:cNvPr>
-          <p:cNvSpPr txBox="1">
-            <a:spLocks/>
-          </p:cNvSpPr>
-          <p:nvPr/>
-        </p:nvSpPr>
-        <p:spPr>
-          <a:xfrm>
-            <a:off x="0" y="148296"/>
-            <a:ext cx="1979333" cy="336629"/>
-          </a:xfrm>
-          <a:prstGeom prst="rect">
-            <a:avLst/>
-          </a:prstGeom>
-        </p:spPr>
-        <p:txBody>
-          <a:bodyPr vert="horz" lIns="91440" tIns="45720" rIns="91440" bIns="45720" rtlCol="0">
-            <a:normAutofit fontScale="77500" lnSpcReduction="20000"/>
-          </a:bodyPr>
-          <a:lstStyle>
-            <a:lvl1pPr marL="0" indent="0" algn="ctr" defTabSz="914400" rtl="0" eaLnBrk="1" latinLnBrk="0" hangingPunct="1">
-              <a:lnSpc>
-                <a:spcPct val="90000"/>
-              </a:lnSpc>
-              <a:spcBef>
-                <a:spcPts val="1000"/>
-              </a:spcBef>
-              <a:buFont typeface="Arial" panose="020B0604020202020204" pitchFamily="34" charset="0"/>
-              <a:buNone/>
-              <a:defRPr sz="2400" kern="1200">
-                <a:solidFill>
-                  <a:schemeClr val="tx1"/>
-                </a:solidFill>
-                <a:latin typeface="+mn-lt"/>
-                <a:ea typeface="+mn-ea"/>
-                <a:cs typeface="+mn-cs"/>
-              </a:defRPr>
-            </a:lvl1pPr>
-            <a:lvl2pPr marL="457200" indent="0" algn="ctr" defTabSz="914400" rtl="0" eaLnBrk="1" latinLnBrk="0" hangingPunct="1">
-              <a:lnSpc>
-                <a:spcPct val="90000"/>
-              </a:lnSpc>
-              <a:spcBef>
-                <a:spcPts val="500"/>
-              </a:spcBef>
-              <a:buFont typeface="Arial" panose="020B0604020202020204" pitchFamily="34" charset="0"/>
-              <a:buNone/>
-              <a:defRPr sz="2000" kern="1200">
-                <a:solidFill>
-                  <a:schemeClr val="tx1"/>
-                </a:solidFill>
-                <a:latin typeface="+mn-lt"/>
-                <a:ea typeface="+mn-ea"/>
-                <a:cs typeface="+mn-cs"/>
-              </a:defRPr>
-            </a:lvl2pPr>
-            <a:lvl3pPr marL="914400" indent="0" algn="ctr" defTabSz="914400" rtl="0" eaLnBrk="1" latinLnBrk="0" hangingPunct="1">
-              <a:lnSpc>
-                <a:spcPct val="90000"/>
-              </a:lnSpc>
-              <a:spcBef>
-                <a:spcPts val="500"/>
-              </a:spcBef>
-              <a:buFont typeface="Arial" panose="020B0604020202020204" pitchFamily="34" charset="0"/>
-              <a:buNone/>
-              <a:defRPr sz="1800" kern="1200">
-                <a:solidFill>
-                  <a:schemeClr val="tx1"/>
-                </a:solidFill>
-                <a:latin typeface="+mn-lt"/>
-                <a:ea typeface="+mn-ea"/>
-                <a:cs typeface="+mn-cs"/>
-              </a:defRPr>
-            </a:lvl3pPr>
-            <a:lvl4pPr marL="1371600" indent="0" algn="ctr" defTabSz="914400" rtl="0" eaLnBrk="1" latinLnBrk="0" hangingPunct="1">
-              <a:lnSpc>
-                <a:spcPct val="90000"/>
-              </a:lnSpc>
-              <a:spcBef>
-                <a:spcPts val="500"/>
-              </a:spcBef>
-              <a:buFont typeface="Arial" panose="020B0604020202020204" pitchFamily="34" charset="0"/>
-              <a:buNone/>
-              <a:defRPr sz="1600" kern="1200">
-                <a:solidFill>
-                  <a:schemeClr val="tx1"/>
-                </a:solidFill>
-                <a:latin typeface="+mn-lt"/>
-                <a:ea typeface="+mn-ea"/>
-                <a:cs typeface="+mn-cs"/>
-              </a:defRPr>
-            </a:lvl4pPr>
-            <a:lvl5pPr marL="1828800" indent="0" algn="ctr" defTabSz="914400" rtl="0" eaLnBrk="1" latinLnBrk="0" hangingPunct="1">
-              <a:lnSpc>
-                <a:spcPct val="90000"/>
-              </a:lnSpc>
-              <a:spcBef>
-                <a:spcPts val="500"/>
-              </a:spcBef>
-              <a:buFont typeface="Arial" panose="020B0604020202020204" pitchFamily="34" charset="0"/>
-              <a:buNone/>
-              <a:defRPr sz="1600" kern="1200">
-                <a:solidFill>
-                  <a:schemeClr val="tx1"/>
-                </a:solidFill>
-                <a:latin typeface="+mn-lt"/>
-                <a:ea typeface="+mn-ea"/>
-                <a:cs typeface="+mn-cs"/>
-              </a:defRPr>
-            </a:lvl5pPr>
-            <a:lvl6pPr marL="2286000" indent="0" algn="ctr" defTabSz="914400" rtl="0" eaLnBrk="1" latinLnBrk="0" hangingPunct="1">
-              <a:lnSpc>
-                <a:spcPct val="90000"/>
-              </a:lnSpc>
-              <a:spcBef>
-                <a:spcPts val="500"/>
-              </a:spcBef>
-              <a:buFont typeface="Arial" panose="020B0604020202020204" pitchFamily="34" charset="0"/>
-              <a:buNone/>
-              <a:defRPr sz="1600" kern="1200">
-                <a:solidFill>
-                  <a:schemeClr val="tx1"/>
-                </a:solidFill>
-                <a:latin typeface="+mn-lt"/>
-                <a:ea typeface="+mn-ea"/>
-                <a:cs typeface="+mn-cs"/>
-              </a:defRPr>
-            </a:lvl6pPr>
-            <a:lvl7pPr marL="2743200" indent="0" algn="ctr" defTabSz="914400" rtl="0" eaLnBrk="1" latinLnBrk="0" hangingPunct="1">
-              <a:lnSpc>
-                <a:spcPct val="90000"/>
-              </a:lnSpc>
-              <a:spcBef>
-                <a:spcPts val="500"/>
-              </a:spcBef>
-              <a:buFont typeface="Arial" panose="020B0604020202020204" pitchFamily="34" charset="0"/>
-              <a:buNone/>
-              <a:defRPr sz="1600" kern="1200">
-                <a:solidFill>
-                  <a:schemeClr val="tx1"/>
-                </a:solidFill>
-                <a:latin typeface="+mn-lt"/>
-                <a:ea typeface="+mn-ea"/>
-                <a:cs typeface="+mn-cs"/>
-              </a:defRPr>
-            </a:lvl7pPr>
-            <a:lvl8pPr marL="3200400" indent="0" algn="ctr" defTabSz="914400" rtl="0" eaLnBrk="1" latinLnBrk="0" hangingPunct="1">
-              <a:lnSpc>
-                <a:spcPct val="90000"/>
-              </a:lnSpc>
-              <a:spcBef>
-                <a:spcPts val="500"/>
-              </a:spcBef>
-              <a:buFont typeface="Arial" panose="020B0604020202020204" pitchFamily="34" charset="0"/>
-              <a:buNone/>
-              <a:defRPr sz="1600" kern="1200">
-                <a:solidFill>
-                  <a:schemeClr val="tx1"/>
-                </a:solidFill>
-                <a:latin typeface="+mn-lt"/>
-                <a:ea typeface="+mn-ea"/>
-                <a:cs typeface="+mn-cs"/>
-              </a:defRPr>
-            </a:lvl8pPr>
-            <a:lvl9pPr marL="3657600" indent="0" algn="ctr" defTabSz="914400" rtl="0" eaLnBrk="1" latinLnBrk="0" hangingPunct="1">
-              <a:lnSpc>
-                <a:spcPct val="90000"/>
-              </a:lnSpc>
-              <a:spcBef>
-                <a:spcPts val="500"/>
-              </a:spcBef>
-              <a:buFont typeface="Arial" panose="020B0604020202020204" pitchFamily="34" charset="0"/>
-              <a:buNone/>
-              <a:defRPr sz="1600" kern="1200">
-                <a:solidFill>
-                  <a:schemeClr val="tx1"/>
-                </a:solidFill>
-                <a:latin typeface="+mn-lt"/>
-                <a:ea typeface="+mn-ea"/>
-                <a:cs typeface="+mn-cs"/>
-              </a:defRPr>
-            </a:lvl9pPr>
-          </a:lstStyle>
-          <a:p>
-            <a:r>
-              <a:rPr lang="pt-BR" dirty="0">
-                <a:solidFill>
-                  <a:schemeClr val="bg1">
-                    <a:lumMod val="85000"/>
-                  </a:schemeClr>
-                </a:solidFill>
-              </a:rPr>
-              <a:t>BANCO DE DADOS</a:t>
-            </a:r>
-          </a:p>
-          <a:p>
-            <a:endParaRPr lang="pt-BR" dirty="0">
-              <a:solidFill>
-                <a:schemeClr val="bg1">
-                  <a:lumMod val="85000"/>
-                </a:schemeClr>
-              </a:solidFill>
-            </a:endParaRPr>
-          </a:p>
-        </p:txBody>
-      </p:sp>
-      <p:cxnSp>
-        <p:nvCxnSpPr>
-          <p:cNvPr id="20" name="Straight Connector 19">
-            <a:extLst>
-              <a:ext uri="{FF2B5EF4-FFF2-40B4-BE49-F238E27FC236}">
-                <a16:creationId xmlns:a16="http://schemas.microsoft.com/office/drawing/2014/main" id="{0462E8D1-A8BA-4164-A1C6-4B1E218ACFFD}"/>
-              </a:ext>
-            </a:extLst>
-          </p:cNvPr>
-          <p:cNvCxnSpPr/>
-          <p:nvPr/>
-        </p:nvCxnSpPr>
-        <p:spPr>
-          <a:xfrm>
-            <a:off x="34290" y="120015"/>
-            <a:ext cx="0" cy="336629"/>
-          </a:xfrm>
-          <a:prstGeom prst="line">
-            <a:avLst/>
-          </a:prstGeom>
-          <a:ln w="76200">
-            <a:solidFill>
-              <a:srgbClr val="D9D9D9"/>
-            </a:solidFill>
-          </a:ln>
-        </p:spPr>
-        <p:style>
-          <a:lnRef idx="1">
-            <a:schemeClr val="accent1"/>
-          </a:lnRef>
-          <a:fillRef idx="0">
-            <a:schemeClr val="accent1"/>
-          </a:fillRef>
-          <a:effectRef idx="0">
-            <a:schemeClr val="accent1"/>
-          </a:effectRef>
-          <a:fontRef idx="minor">
-            <a:schemeClr val="tx1"/>
-          </a:fontRef>
-        </p:style>
-      </p:cxnSp>
-      <p:sp>
-        <p:nvSpPr>
-          <p:cNvPr id="21" name="Rectangle 20">
-            <a:extLst>
-              <a:ext uri="{FF2B5EF4-FFF2-40B4-BE49-F238E27FC236}">
-                <a16:creationId xmlns:a16="http://schemas.microsoft.com/office/drawing/2014/main" id="{36681A73-EE3D-474B-9C1F-4CEADEF09A88}"/>
-              </a:ext>
-            </a:extLst>
-          </p:cNvPr>
-          <p:cNvSpPr/>
-          <p:nvPr/>
-        </p:nvSpPr>
-        <p:spPr>
-          <a:xfrm>
-            <a:off x="34290" y="42983"/>
-            <a:ext cx="12022592" cy="6695002"/>
-          </a:xfrm>
-          <a:prstGeom prst="rect">
-            <a:avLst/>
-          </a:prstGeom>
-          <a:noFill/>
-          <a:ln>
-            <a:solidFill>
-              <a:srgbClr val="D9D9D9"/>
-            </a:solidFill>
-          </a:ln>
-        </p:spPr>
-        <p:style>
-          <a:lnRef idx="2">
-            <a:schemeClr val="accent1">
-              <a:shade val="50000"/>
-            </a:schemeClr>
-          </a:lnRef>
-          <a:fillRef idx="1">
-            <a:schemeClr val="accent1"/>
-          </a:fillRef>
-          <a:effectRef idx="0">
-            <a:schemeClr val="accent1"/>
-          </a:effectRef>
-          <a:fontRef idx="minor">
-            <a:schemeClr val="lt1"/>
-          </a:fontRef>
-        </p:style>
-        <p:txBody>
-          <a:bodyPr rtlCol="0" anchor="ctr"/>
-          <a:lstStyle/>
-          <a:p>
-            <a:pPr algn="ctr"/>
-            <a:endParaRPr lang="en-US"/>
-          </a:p>
-        </p:txBody>
-      </p:sp>
-      <p:sp>
-        <p:nvSpPr>
-          <p:cNvPr id="15" name="TextBox 14">
-            <a:extLst>
-              <a:ext uri="{FF2B5EF4-FFF2-40B4-BE49-F238E27FC236}">
-                <a16:creationId xmlns:a16="http://schemas.microsoft.com/office/drawing/2014/main" id="{338A5148-77DF-41E1-96E9-1910E407C2F1}"/>
-              </a:ext>
-            </a:extLst>
-          </p:cNvPr>
-          <p:cNvSpPr txBox="1"/>
-          <p:nvPr/>
-        </p:nvSpPr>
-        <p:spPr>
-          <a:xfrm>
-            <a:off x="416585" y="456644"/>
-            <a:ext cx="3945185" cy="880369"/>
-          </a:xfrm>
-          <a:prstGeom prst="rect">
-            <a:avLst/>
-          </a:prstGeom>
-          <a:noFill/>
-        </p:spPr>
-        <p:txBody>
-          <a:bodyPr wrap="square" rtlCol="0">
-            <a:spAutoFit/>
-          </a:bodyPr>
-          <a:lstStyle/>
-          <a:p>
-            <a:pPr>
-              <a:lnSpc>
-                <a:spcPct val="150000"/>
-              </a:lnSpc>
-            </a:pPr>
-            <a:r>
-              <a:rPr lang="pt-BR" dirty="0">
-                <a:solidFill>
-                  <a:schemeClr val="bg1"/>
-                </a:solidFill>
-              </a:rPr>
-              <a:t>Utilizei o MYSQL SERVER como banco de dados.  Via prompt de comando</a:t>
-            </a:r>
-          </a:p>
-        </p:txBody>
-      </p:sp>
-      <p:pic>
-        <p:nvPicPr>
-          <p:cNvPr id="4" name="Picture 3">
-            <a:extLst>
-              <a:ext uri="{FF2B5EF4-FFF2-40B4-BE49-F238E27FC236}">
-                <a16:creationId xmlns:a16="http://schemas.microsoft.com/office/drawing/2014/main" id="{08B50E26-9FC7-4818-A138-90238011CB16}"/>
-              </a:ext>
-            </a:extLst>
-          </p:cNvPr>
-          <p:cNvPicPr>
-            <a:picLocks noChangeAspect="1"/>
-          </p:cNvPicPr>
-          <p:nvPr/>
-        </p:nvPicPr>
-        <p:blipFill>
-          <a:blip r:embed="rId2"/>
-          <a:stretch>
-            <a:fillRect/>
-          </a:stretch>
-        </p:blipFill>
-        <p:spPr>
-          <a:xfrm>
-            <a:off x="477994" y="1750674"/>
-            <a:ext cx="6022183" cy="4054814"/>
-          </a:xfrm>
-          <a:prstGeom prst="rect">
-            <a:avLst/>
-          </a:prstGeom>
-        </p:spPr>
-      </p:pic>
-      <p:pic>
-        <p:nvPicPr>
-          <p:cNvPr id="3" name="Picture 2">
-            <a:extLst>
-              <a:ext uri="{FF2B5EF4-FFF2-40B4-BE49-F238E27FC236}">
-                <a16:creationId xmlns:a16="http://schemas.microsoft.com/office/drawing/2014/main" id="{8116F513-8A73-4AB4-8DB7-E22BB17A9FEA}"/>
-              </a:ext>
-            </a:extLst>
-          </p:cNvPr>
-          <p:cNvPicPr>
-            <a:picLocks noChangeAspect="1"/>
-          </p:cNvPicPr>
-          <p:nvPr/>
-        </p:nvPicPr>
-        <p:blipFill>
-          <a:blip r:embed="rId3"/>
-          <a:stretch>
-            <a:fillRect/>
-          </a:stretch>
-        </p:blipFill>
-        <p:spPr>
-          <a:xfrm>
-            <a:off x="6939296" y="316610"/>
-            <a:ext cx="3945185" cy="5990838"/>
-          </a:xfrm>
-          <a:prstGeom prst="rect">
-            <a:avLst/>
-          </a:prstGeom>
-        </p:spPr>
-      </p:pic>
-    </p:spTree>
-    <p:extLst>
-      <p:ext uri="{BB962C8B-B14F-4D97-AF65-F5344CB8AC3E}">
-        <p14:creationId xmlns:p14="http://schemas.microsoft.com/office/powerpoint/2010/main" val="179061172"/>
       </p:ext>
     </p:extLst>
   </p:cSld>
@@ -6832,7 +6722,7 @@
         </p:spPr>
         <p:txBody>
           <a:bodyPr vert="horz" lIns="91440" tIns="45720" rIns="91440" bIns="45720" rtlCol="0">
-            <a:normAutofit fontScale="92500" lnSpcReduction="20000"/>
+            <a:normAutofit fontScale="77500" lnSpcReduction="20000"/>
           </a:bodyPr>
           <a:lstStyle>
             <a:lvl1pPr marL="0" indent="0" algn="ctr" defTabSz="914400" rtl="0" eaLnBrk="1" latinLnBrk="0" hangingPunct="1">
@@ -7007,7 +6897,7 @@
                   </a:schemeClr>
                 </a:solidFill>
               </a:rPr>
-              <a:t>POWER BI</a:t>
+              <a:t>BANCO DE DADOS</a:t>
             </a:r>
           </a:p>
           <a:p>
@@ -7128,8 +7018,8 @@
         </p:nvSpPr>
         <p:spPr>
           <a:xfrm>
-            <a:off x="342792" y="357802"/>
-            <a:ext cx="4450210" cy="464871"/>
+            <a:off x="416585" y="456644"/>
+            <a:ext cx="3945185" cy="880369"/>
           </a:xfrm>
           <a:prstGeom prst="rect">
             <a:avLst/>
@@ -7153,17 +7043,17 @@
                   <a:schemeClr val="bg1"/>
                 </a:solidFill>
               </a:rPr>
-              <a:t>Utilizei o POWER BI para analise dos dados</a:t>
+              <a:t>Utilizei o MYSQL SERVER como banco de dados.  Via prompt de comando</a:t>
             </a:r>
           </a:p>
         </p:txBody>
       </p:sp>
       <p:pic>
         <p:nvPicPr>
-          <p:cNvPr id="3" name="Picture 2">
-            <a:extLst>
-              <a:ext uri="{FF2B5EF4-FFF2-40B4-BE49-F238E27FC236}">
-                <a16:creationId xmlns:a16="http://schemas.microsoft.com/office/drawing/2014/main" id="{504D19F9-93B8-461A-B388-93C9375C04F5}"/>
+          <p:cNvPr id="4" name="Picture 3">
+            <a:extLst>
+              <a:ext uri="{FF2B5EF4-FFF2-40B4-BE49-F238E27FC236}">
+                <a16:creationId xmlns:a16="http://schemas.microsoft.com/office/drawing/2014/main" id="{08B50E26-9FC7-4818-A138-90238011CB16}"/>
               </a:ext>
             </a:extLst>
           </p:cNvPr>
@@ -7180,8 +7070,38 @@
         </p:blipFill>
         <p:spPr>
           <a:xfrm>
-            <a:off x="427634" y="930282"/>
-            <a:ext cx="10045546" cy="5640961"/>
+            <a:off x="477994" y="1750674"/>
+            <a:ext cx="6022183" cy="4054814"/>
+          </a:xfrm>
+          <a:prstGeom prst="rect">
+            <a:avLst/>
+          </a:prstGeom>
+        </p:spPr>
+      </p:pic>
+      <p:pic>
+        <p:nvPicPr>
+          <p:cNvPr id="3" name="Picture 2">
+            <a:extLst>
+              <a:ext uri="{FF2B5EF4-FFF2-40B4-BE49-F238E27FC236}">
+                <a16:creationId xmlns:a16="http://schemas.microsoft.com/office/drawing/2014/main" id="{8116F513-8A73-4AB4-8DB7-E22BB17A9FEA}"/>
+              </a:ext>
+            </a:extLst>
+          </p:cNvPr>
+          <p:cNvPicPr>
+            <a:picLocks noChangeAspect="1"/>
+          </p:cNvPicPr>
+          <p:nvPr/>
+        </p:nvPicPr>
+        <p:blipFill>
+          <a:blip r:embed="rId3"/>
+          <a:stretch>
+            <a:fillRect/>
+          </a:stretch>
+        </p:blipFill>
+        <p:spPr>
+          <a:xfrm>
+            <a:off x="6939296" y="316610"/>
+            <a:ext cx="3945185" cy="5990838"/>
           </a:xfrm>
           <a:prstGeom prst="rect">
             <a:avLst/>
@@ -7191,7 +7111,7 @@
     </p:spTree>
     <p:extLst>
       <p:ext uri="{BB962C8B-B14F-4D97-AF65-F5344CB8AC3E}">
-        <p14:creationId xmlns:p14="http://schemas.microsoft.com/office/powerpoint/2010/main" val="2977151621"/>
+        <p14:creationId xmlns:p14="http://schemas.microsoft.com/office/powerpoint/2010/main" val="179061172"/>
       </p:ext>
     </p:extLst>
   </p:cSld>
@@ -7582,10 +7502,10 @@
       </p:sp>
       <p:pic>
         <p:nvPicPr>
-          <p:cNvPr id="7" name="Picture 6">
-            <a:extLst>
-              <a:ext uri="{FF2B5EF4-FFF2-40B4-BE49-F238E27FC236}">
-                <a16:creationId xmlns:a16="http://schemas.microsoft.com/office/drawing/2014/main" id="{AC47CF72-9A30-4FB8-AD68-517FA739021D}"/>
+          <p:cNvPr id="3" name="Picture 2">
+            <a:extLst>
+              <a:ext uri="{FF2B5EF4-FFF2-40B4-BE49-F238E27FC236}">
+                <a16:creationId xmlns:a16="http://schemas.microsoft.com/office/drawing/2014/main" id="{504D19F9-93B8-461A-B388-93C9375C04F5}"/>
               </a:ext>
             </a:extLst>
           </p:cNvPr>
@@ -7602,8 +7522,430 @@
         </p:blipFill>
         <p:spPr>
           <a:xfrm>
-            <a:off x="461913" y="968603"/>
-            <a:ext cx="10143241" cy="5454047"/>
+            <a:off x="427634" y="930282"/>
+            <a:ext cx="10045546" cy="5640961"/>
+          </a:xfrm>
+          <a:prstGeom prst="rect">
+            <a:avLst/>
+          </a:prstGeom>
+        </p:spPr>
+      </p:pic>
+    </p:spTree>
+    <p:extLst>
+      <p:ext uri="{BB962C8B-B14F-4D97-AF65-F5344CB8AC3E}">
+        <p14:creationId xmlns:p14="http://schemas.microsoft.com/office/powerpoint/2010/main" val="2977151621"/>
+      </p:ext>
+    </p:extLst>
+  </p:cSld>
+  <p:clrMapOvr>
+    <a:masterClrMapping/>
+  </p:clrMapOvr>
+</p:sld>
+</file>
+
+<file path=ppt/slides/slide7.xml><?xml version="1.0" encoding="utf-8"?>
+<p:sld xmlns:a="http://schemas.openxmlformats.org/drawingml/2006/main" xmlns:r="http://schemas.openxmlformats.org/officeDocument/2006/relationships" xmlns:p="http://schemas.openxmlformats.org/presentationml/2006/main">
+  <p:cSld>
+    <p:bg>
+      <p:bgPr>
+        <a:solidFill>
+          <a:schemeClr val="tx1">
+            <a:lumMod val="85000"/>
+            <a:lumOff val="15000"/>
+          </a:schemeClr>
+        </a:solidFill>
+        <a:effectLst/>
+      </p:bgPr>
+    </p:bg>
+    <p:spTree>
+      <p:nvGrpSpPr>
+        <p:cNvPr id="1" name=""/>
+        <p:cNvGrpSpPr/>
+        <p:nvPr/>
+      </p:nvGrpSpPr>
+      <p:grpSpPr>
+        <a:xfrm>
+          <a:off x="0" y="0"/>
+          <a:ext cx="0" cy="0"/>
+          <a:chOff x="0" y="0"/>
+          <a:chExt cx="0" cy="0"/>
+        </a:xfrm>
+      </p:grpSpPr>
+      <p:sp>
+        <p:nvSpPr>
+          <p:cNvPr id="19" name="Subtitle 2">
+            <a:extLst>
+              <a:ext uri="{FF2B5EF4-FFF2-40B4-BE49-F238E27FC236}">
+                <a16:creationId xmlns:a16="http://schemas.microsoft.com/office/drawing/2014/main" id="{0DFDD307-DE49-4B0C-AB7A-6806D6626CBC}"/>
+              </a:ext>
+            </a:extLst>
+          </p:cNvPr>
+          <p:cNvSpPr txBox="1">
+            <a:spLocks/>
+          </p:cNvSpPr>
+          <p:nvPr/>
+        </p:nvSpPr>
+        <p:spPr>
+          <a:xfrm>
+            <a:off x="0" y="148296"/>
+            <a:ext cx="1979333" cy="336629"/>
+          </a:xfrm>
+          <a:prstGeom prst="rect">
+            <a:avLst/>
+          </a:prstGeom>
+        </p:spPr>
+        <p:txBody>
+          <a:bodyPr vert="horz" lIns="91440" tIns="45720" rIns="91440" bIns="45720" rtlCol="0">
+            <a:normAutofit fontScale="92500" lnSpcReduction="20000"/>
+          </a:bodyPr>
+          <a:lstStyle>
+            <a:lvl1pPr marL="0" indent="0" algn="ctr" defTabSz="914400" rtl="0" eaLnBrk="1" latinLnBrk="0" hangingPunct="1">
+              <a:lnSpc>
+                <a:spcPct val="90000"/>
+              </a:lnSpc>
+              <a:spcBef>
+                <a:spcPts val="1000"/>
+              </a:spcBef>
+              <a:buFont typeface="Arial" panose="020B0604020202020204" pitchFamily="34" charset="0"/>
+              <a:buNone/>
+              <a:defRPr sz="2400" kern="1200">
+                <a:solidFill>
+                  <a:schemeClr val="tx1"/>
+                </a:solidFill>
+                <a:latin typeface="+mn-lt"/>
+                <a:ea typeface="+mn-ea"/>
+                <a:cs typeface="+mn-cs"/>
+              </a:defRPr>
+            </a:lvl1pPr>
+            <a:lvl2pPr marL="457200" indent="0" algn="ctr" defTabSz="914400" rtl="0" eaLnBrk="1" latinLnBrk="0" hangingPunct="1">
+              <a:lnSpc>
+                <a:spcPct val="90000"/>
+              </a:lnSpc>
+              <a:spcBef>
+                <a:spcPts val="500"/>
+              </a:spcBef>
+              <a:buFont typeface="Arial" panose="020B0604020202020204" pitchFamily="34" charset="0"/>
+              <a:buNone/>
+              <a:defRPr sz="2000" kern="1200">
+                <a:solidFill>
+                  <a:schemeClr val="tx1"/>
+                </a:solidFill>
+                <a:latin typeface="+mn-lt"/>
+                <a:ea typeface="+mn-ea"/>
+                <a:cs typeface="+mn-cs"/>
+              </a:defRPr>
+            </a:lvl2pPr>
+            <a:lvl3pPr marL="914400" indent="0" algn="ctr" defTabSz="914400" rtl="0" eaLnBrk="1" latinLnBrk="0" hangingPunct="1">
+              <a:lnSpc>
+                <a:spcPct val="90000"/>
+              </a:lnSpc>
+              <a:spcBef>
+                <a:spcPts val="500"/>
+              </a:spcBef>
+              <a:buFont typeface="Arial" panose="020B0604020202020204" pitchFamily="34" charset="0"/>
+              <a:buNone/>
+              <a:defRPr sz="1800" kern="1200">
+                <a:solidFill>
+                  <a:schemeClr val="tx1"/>
+                </a:solidFill>
+                <a:latin typeface="+mn-lt"/>
+                <a:ea typeface="+mn-ea"/>
+                <a:cs typeface="+mn-cs"/>
+              </a:defRPr>
+            </a:lvl3pPr>
+            <a:lvl4pPr marL="1371600" indent="0" algn="ctr" defTabSz="914400" rtl="0" eaLnBrk="1" latinLnBrk="0" hangingPunct="1">
+              <a:lnSpc>
+                <a:spcPct val="90000"/>
+              </a:lnSpc>
+              <a:spcBef>
+                <a:spcPts val="500"/>
+              </a:spcBef>
+              <a:buFont typeface="Arial" panose="020B0604020202020204" pitchFamily="34" charset="0"/>
+              <a:buNone/>
+              <a:defRPr sz="1600" kern="1200">
+                <a:solidFill>
+                  <a:schemeClr val="tx1"/>
+                </a:solidFill>
+                <a:latin typeface="+mn-lt"/>
+                <a:ea typeface="+mn-ea"/>
+                <a:cs typeface="+mn-cs"/>
+              </a:defRPr>
+            </a:lvl4pPr>
+            <a:lvl5pPr marL="1828800" indent="0" algn="ctr" defTabSz="914400" rtl="0" eaLnBrk="1" latinLnBrk="0" hangingPunct="1">
+              <a:lnSpc>
+                <a:spcPct val="90000"/>
+              </a:lnSpc>
+              <a:spcBef>
+                <a:spcPts val="500"/>
+              </a:spcBef>
+              <a:buFont typeface="Arial" panose="020B0604020202020204" pitchFamily="34" charset="0"/>
+              <a:buNone/>
+              <a:defRPr sz="1600" kern="1200">
+                <a:solidFill>
+                  <a:schemeClr val="tx1"/>
+                </a:solidFill>
+                <a:latin typeface="+mn-lt"/>
+                <a:ea typeface="+mn-ea"/>
+                <a:cs typeface="+mn-cs"/>
+              </a:defRPr>
+            </a:lvl5pPr>
+            <a:lvl6pPr marL="2286000" indent="0" algn="ctr" defTabSz="914400" rtl="0" eaLnBrk="1" latinLnBrk="0" hangingPunct="1">
+              <a:lnSpc>
+                <a:spcPct val="90000"/>
+              </a:lnSpc>
+              <a:spcBef>
+                <a:spcPts val="500"/>
+              </a:spcBef>
+              <a:buFont typeface="Arial" panose="020B0604020202020204" pitchFamily="34" charset="0"/>
+              <a:buNone/>
+              <a:defRPr sz="1600" kern="1200">
+                <a:solidFill>
+                  <a:schemeClr val="tx1"/>
+                </a:solidFill>
+                <a:latin typeface="+mn-lt"/>
+                <a:ea typeface="+mn-ea"/>
+                <a:cs typeface="+mn-cs"/>
+              </a:defRPr>
+            </a:lvl6pPr>
+            <a:lvl7pPr marL="2743200" indent="0" algn="ctr" defTabSz="914400" rtl="0" eaLnBrk="1" latinLnBrk="0" hangingPunct="1">
+              <a:lnSpc>
+                <a:spcPct val="90000"/>
+              </a:lnSpc>
+              <a:spcBef>
+                <a:spcPts val="500"/>
+              </a:spcBef>
+              <a:buFont typeface="Arial" panose="020B0604020202020204" pitchFamily="34" charset="0"/>
+              <a:buNone/>
+              <a:defRPr sz="1600" kern="1200">
+                <a:solidFill>
+                  <a:schemeClr val="tx1"/>
+                </a:solidFill>
+                <a:latin typeface="+mn-lt"/>
+                <a:ea typeface="+mn-ea"/>
+                <a:cs typeface="+mn-cs"/>
+              </a:defRPr>
+            </a:lvl7pPr>
+            <a:lvl8pPr marL="3200400" indent="0" algn="ctr" defTabSz="914400" rtl="0" eaLnBrk="1" latinLnBrk="0" hangingPunct="1">
+              <a:lnSpc>
+                <a:spcPct val="90000"/>
+              </a:lnSpc>
+              <a:spcBef>
+                <a:spcPts val="500"/>
+              </a:spcBef>
+              <a:buFont typeface="Arial" panose="020B0604020202020204" pitchFamily="34" charset="0"/>
+              <a:buNone/>
+              <a:defRPr sz="1600" kern="1200">
+                <a:solidFill>
+                  <a:schemeClr val="tx1"/>
+                </a:solidFill>
+                <a:latin typeface="+mn-lt"/>
+                <a:ea typeface="+mn-ea"/>
+                <a:cs typeface="+mn-cs"/>
+              </a:defRPr>
+            </a:lvl8pPr>
+            <a:lvl9pPr marL="3657600" indent="0" algn="ctr" defTabSz="914400" rtl="0" eaLnBrk="1" latinLnBrk="0" hangingPunct="1">
+              <a:lnSpc>
+                <a:spcPct val="90000"/>
+              </a:lnSpc>
+              <a:spcBef>
+                <a:spcPts val="500"/>
+              </a:spcBef>
+              <a:buFont typeface="Arial" panose="020B0604020202020204" pitchFamily="34" charset="0"/>
+              <a:buNone/>
+              <a:defRPr sz="1600" kern="1200">
+                <a:solidFill>
+                  <a:schemeClr val="tx1"/>
+                </a:solidFill>
+                <a:latin typeface="+mn-lt"/>
+                <a:ea typeface="+mn-ea"/>
+                <a:cs typeface="+mn-cs"/>
+              </a:defRPr>
+            </a:lvl9pPr>
+          </a:lstStyle>
+          <a:p>
+            <a:r>
+              <a:rPr lang="pt-BR" dirty="0">
+                <a:solidFill>
+                  <a:schemeClr val="bg1">
+                    <a:lumMod val="85000"/>
+                  </a:schemeClr>
+                </a:solidFill>
+              </a:rPr>
+              <a:t>POWER BI</a:t>
+            </a:r>
+          </a:p>
+          <a:p>
+            <a:endParaRPr lang="pt-BR" dirty="0">
+              <a:solidFill>
+                <a:schemeClr val="bg1">
+                  <a:lumMod val="85000"/>
+                </a:schemeClr>
+              </a:solidFill>
+            </a:endParaRPr>
+          </a:p>
+        </p:txBody>
+      </p:sp>
+      <p:cxnSp>
+        <p:nvCxnSpPr>
+          <p:cNvPr id="20" name="Straight Connector 19">
+            <a:extLst>
+              <a:ext uri="{FF2B5EF4-FFF2-40B4-BE49-F238E27FC236}">
+                <a16:creationId xmlns:a16="http://schemas.microsoft.com/office/drawing/2014/main" id="{0462E8D1-A8BA-4164-A1C6-4B1E218ACFFD}"/>
+              </a:ext>
+            </a:extLst>
+          </p:cNvPr>
+          <p:cNvCxnSpPr/>
+          <p:nvPr/>
+        </p:nvCxnSpPr>
+        <p:spPr>
+          <a:xfrm>
+            <a:off x="34290" y="120015"/>
+            <a:ext cx="0" cy="336629"/>
+          </a:xfrm>
+          <a:prstGeom prst="line">
+            <a:avLst/>
+          </a:prstGeom>
+          <a:ln w="76200">
+            <a:solidFill>
+              <a:srgbClr val="D9D9D9"/>
+            </a:solidFill>
+          </a:ln>
+        </p:spPr>
+        <p:style>
+          <a:lnRef idx="1">
+            <a:schemeClr val="accent1"/>
+          </a:lnRef>
+          <a:fillRef idx="0">
+            <a:schemeClr val="accent1"/>
+          </a:fillRef>
+          <a:effectRef idx="0">
+            <a:schemeClr val="accent1"/>
+          </a:effectRef>
+          <a:fontRef idx="minor">
+            <a:schemeClr val="tx1"/>
+          </a:fontRef>
+        </p:style>
+      </p:cxnSp>
+      <p:sp>
+        <p:nvSpPr>
+          <p:cNvPr id="21" name="Rectangle 20">
+            <a:extLst>
+              <a:ext uri="{FF2B5EF4-FFF2-40B4-BE49-F238E27FC236}">
+                <a16:creationId xmlns:a16="http://schemas.microsoft.com/office/drawing/2014/main" id="{36681A73-EE3D-474B-9C1F-4CEADEF09A88}"/>
+              </a:ext>
+            </a:extLst>
+          </p:cNvPr>
+          <p:cNvSpPr/>
+          <p:nvPr/>
+        </p:nvSpPr>
+        <p:spPr>
+          <a:xfrm>
+            <a:off x="34290" y="42983"/>
+            <a:ext cx="12022592" cy="6695002"/>
+          </a:xfrm>
+          <a:prstGeom prst="rect">
+            <a:avLst/>
+          </a:prstGeom>
+          <a:noFill/>
+          <a:ln>
+            <a:solidFill>
+              <a:srgbClr val="D9D9D9"/>
+            </a:solidFill>
+          </a:ln>
+        </p:spPr>
+        <p:style>
+          <a:lnRef idx="2">
+            <a:schemeClr val="accent1">
+              <a:shade val="50000"/>
+            </a:schemeClr>
+          </a:lnRef>
+          <a:fillRef idx="1">
+            <a:schemeClr val="accent1"/>
+          </a:fillRef>
+          <a:effectRef idx="0">
+            <a:schemeClr val="accent1"/>
+          </a:effectRef>
+          <a:fontRef idx="minor">
+            <a:schemeClr val="lt1"/>
+          </a:fontRef>
+        </p:style>
+        <p:txBody>
+          <a:bodyPr rtlCol="0" anchor="ctr"/>
+          <a:lstStyle/>
+          <a:p>
+            <a:pPr algn="ctr"/>
+            <a:endParaRPr lang="en-US"/>
+          </a:p>
+        </p:txBody>
+      </p:sp>
+      <p:sp>
+        <p:nvSpPr>
+          <p:cNvPr id="15" name="TextBox 14">
+            <a:extLst>
+              <a:ext uri="{FF2B5EF4-FFF2-40B4-BE49-F238E27FC236}">
+                <a16:creationId xmlns:a16="http://schemas.microsoft.com/office/drawing/2014/main" id="{338A5148-77DF-41E1-96E9-1910E407C2F1}"/>
+              </a:ext>
+            </a:extLst>
+          </p:cNvPr>
+          <p:cNvSpPr txBox="1"/>
+          <p:nvPr/>
+        </p:nvSpPr>
+        <p:spPr>
+          <a:xfrm>
+            <a:off x="342792" y="357802"/>
+            <a:ext cx="4450210" cy="464871"/>
+          </a:xfrm>
+          <a:prstGeom prst="rect">
+            <a:avLst/>
+          </a:prstGeom>
+          <a:noFill/>
+        </p:spPr>
+        <p:txBody>
+          <a:bodyPr wrap="square" rtlCol="0">
+            <a:spAutoFit/>
+          </a:bodyPr>
+          <a:lstStyle/>
+          <a:p>
+            <a:pPr>
+              <a:lnSpc>
+                <a:spcPct val="150000"/>
+              </a:lnSpc>
+            </a:pPr>
+            <a:r>
+              <a:rPr lang="pt-BR" dirty="0">
+                <a:solidFill>
+                  <a:schemeClr val="bg1"/>
+                </a:solidFill>
+              </a:rPr>
+              <a:t>Utilizei o POWER BI para analise dos dados</a:t>
+            </a:r>
+          </a:p>
+        </p:txBody>
+      </p:sp>
+      <p:pic>
+        <p:nvPicPr>
+          <p:cNvPr id="3" name="Picture 2">
+            <a:extLst>
+              <a:ext uri="{FF2B5EF4-FFF2-40B4-BE49-F238E27FC236}">
+                <a16:creationId xmlns:a16="http://schemas.microsoft.com/office/drawing/2014/main" id="{49A664DC-C22D-48C4-A494-2029D3D870B7}"/>
+              </a:ext>
+            </a:extLst>
+          </p:cNvPr>
+          <p:cNvPicPr>
+            <a:picLocks noChangeAspect="1"/>
+          </p:cNvPicPr>
+          <p:nvPr/>
+        </p:nvPicPr>
+        <p:blipFill>
+          <a:blip r:embed="rId2"/>
+          <a:stretch>
+            <a:fillRect/>
+          </a:stretch>
+        </p:blipFill>
+        <p:spPr>
+          <a:xfrm>
+            <a:off x="440193" y="799745"/>
+            <a:ext cx="10550092" cy="5770738"/>
           </a:xfrm>
           <a:prstGeom prst="rect">
             <a:avLst/>
@@ -7623,7 +7965,7 @@
 </p:sld>
 </file>
 
-<file path=ppt/slides/slide7.xml><?xml version="1.0" encoding="utf-8"?>
+<file path=ppt/slides/slide8.xml><?xml version="1.0" encoding="utf-8"?>
 <p:sld xmlns:a="http://schemas.openxmlformats.org/drawingml/2006/main" xmlns:r="http://schemas.openxmlformats.org/officeDocument/2006/relationships" xmlns:p="http://schemas.openxmlformats.org/presentationml/2006/main">
   <p:cSld>
     <p:bg>

</xml_diff>